<commit_message>
week 8 ppt added
</commit_message>
<xml_diff>
--- a/doc/mid-term.pptx
+++ b/doc/mid-term.pptx
@@ -116,6 +116,11 @@
       </a:defRPr>
     </a:lvl9pPr>
   </p:defaultTextStyle>
+  <p:extLst>
+    <p:ext uri="{EFAFB233-063F-42B5-8137-9DF3F51BA10A}">
+      <p15:sldGuideLst xmlns:p15="http://schemas.microsoft.com/office/powerpoint/2012/main"/>
+    </p:ext>
+  </p:extLst>
 </p:presentation>
 </file>
 
@@ -7000,7 +7005,9 @@
         </p:nvSpPr>
         <p:spPr/>
         <p:txBody>
-          <a:bodyPr/>
+          <a:bodyPr>
+            <a:normAutofit/>
+          </a:bodyPr>
           <a:lstStyle/>
           <a:p>
             <a:r>
@@ -7029,7 +7036,11 @@
             </a:r>
             <a:r>
               <a:rPr lang="zh-CN" altLang="en-US" dirty="0" smtClean="0"/>
-              <a:t>上的移植：</a:t>
+              <a:t>上的移植</a:t>
+            </a:r>
+            <a:r>
+              <a:rPr lang="zh-CN" altLang="en-US" dirty="0" smtClean="0"/>
+              <a:t>：</a:t>
             </a:r>
             <a:endParaRPr lang="en-US" altLang="zh-CN" dirty="0" smtClean="0"/>
           </a:p>
@@ -7037,38 +7048,11 @@
             <a:pPr lvl="1"/>
             <a:r>
               <a:rPr lang="zh-CN" altLang="en-US" dirty="0" smtClean="0"/>
-              <a:t>版本过于落后</a:t>
-            </a:r>
-            <a:r>
-              <a:rPr lang="en-US" altLang="zh-CN" dirty="0" smtClean="0"/>
-              <a:t>(2010</a:t>
-            </a:r>
-            <a:r>
-              <a:rPr lang="zh-CN" altLang="en-US" dirty="0" smtClean="0"/>
-              <a:t>年，</a:t>
+              <a:t>实现的是</a:t>
             </a:r>
             <a:r>
               <a:rPr lang="en-US" altLang="zh-CN" dirty="0" err="1" smtClean="0"/>
-              <a:t>golang</a:t>
-            </a:r>
-            <a:r>
-              <a:rPr lang="zh-CN" altLang="en-US" dirty="0" smtClean="0"/>
-              <a:t>还未形成第一个稳定版本</a:t>
-            </a:r>
-            <a:r>
-              <a:rPr lang="en-US" altLang="zh-CN" dirty="0" smtClean="0"/>
-              <a:t>)</a:t>
-            </a:r>
-          </a:p>
-          <a:p>
-            <a:pPr lvl="1"/>
-            <a:r>
-              <a:rPr lang="zh-CN" altLang="en-US" dirty="0" smtClean="0"/>
-              <a:t>实现的是</a:t>
-            </a:r>
-            <a:r>
-              <a:rPr lang="en-US" altLang="zh-CN" dirty="0" err="1"/>
-              <a:t>U</a:t>
+              <a:t>u</a:t>
             </a:r>
             <a:r>
               <a:rPr lang="en-US" altLang="zh-CN" dirty="0" err="1" smtClean="0"/>
@@ -7086,13 +7070,45 @@
               <a:rPr lang="zh-CN" altLang="en-US" dirty="0" smtClean="0"/>
               <a:t>以及其他一些功能</a:t>
             </a:r>
-            <a:endParaRPr lang="en-US" altLang="zh-CN" dirty="0"/>
+            <a:endParaRPr lang="en-US" altLang="zh-CN" dirty="0" smtClean="0"/>
           </a:p>
           <a:p>
             <a:pPr lvl="1"/>
             <a:r>
-              <a:rPr lang="zh-CN" altLang="en-US" dirty="0" smtClean="0"/>
-              <a:t>所幸虽然工具链已经和现在区别很大，但思路可以参考</a:t>
+              <a:rPr lang="zh-CN" altLang="en-US" dirty="0"/>
+              <a:t>版本过于落后</a:t>
+            </a:r>
+            <a:r>
+              <a:rPr lang="en-US" altLang="zh-CN" dirty="0"/>
+              <a:t>(2010</a:t>
+            </a:r>
+            <a:r>
+              <a:rPr lang="zh-CN" altLang="en-US" dirty="0"/>
+              <a:t>年，</a:t>
+            </a:r>
+            <a:r>
+              <a:rPr lang="en-US" altLang="zh-CN" dirty="0" err="1"/>
+              <a:t>golang</a:t>
+            </a:r>
+            <a:r>
+              <a:rPr lang="zh-CN" altLang="en-US" dirty="0"/>
+              <a:t>还未形成第一个稳定版本</a:t>
+            </a:r>
+            <a:r>
+              <a:rPr lang="en-US" altLang="zh-CN" smtClean="0"/>
+              <a:t>)</a:t>
+            </a:r>
+            <a:endParaRPr lang="en-US" altLang="zh-CN" dirty="0" smtClean="0"/>
+          </a:p>
+          <a:p>
+            <a:pPr lvl="1"/>
+            <a:r>
+              <a:rPr lang="zh-CN" altLang="en-US" dirty="0" smtClean="0"/>
+              <a:t>所</a:t>
+            </a:r>
+            <a:r>
+              <a:rPr lang="zh-CN" altLang="en-US" dirty="0" smtClean="0"/>
+              <a:t>幸虽然工具链已经和现在区别很大，但思路可以参考</a:t>
             </a:r>
             <a:endParaRPr lang="en-US" altLang="zh-CN" dirty="0" smtClean="0"/>
           </a:p>
@@ -8044,8 +8060,16 @@
               <a:t>strace</a:t>
             </a:r>
             <a:r>
-              <a:rPr lang="zh-CN" altLang="en-US" dirty="0" smtClean="0"/>
-              <a:t>等工具</a:t>
+              <a:rPr lang="en-US" altLang="zh-CN" dirty="0" smtClean="0"/>
+              <a:t> / RPC</a:t>
+            </a:r>
+            <a:r>
+              <a:rPr lang="zh-CN" altLang="en-US" dirty="0" smtClean="0"/>
+              <a:t>等</a:t>
+            </a:r>
+            <a:r>
+              <a:rPr lang="zh-CN" altLang="en-US" dirty="0" smtClean="0"/>
+              <a:t>工具</a:t>
             </a:r>
             <a:endParaRPr lang="en-US" altLang="zh-CN" dirty="0" smtClean="0"/>
           </a:p>

</xml_diff>